<commit_message>
some modification of detection and estimation section
</commit_message>
<xml_diff>
--- a/main_matlab_figures/New Microsoft PowerPoint Presentation (4).pptx
+++ b/main_matlab_figures/New Microsoft PowerPoint Presentation (4).pptx
@@ -259,7 +259,7 @@
           <a:p>
             <a:fld id="{D665B2A5-0536-4469-8519-ACEA26E5B44D}" type="datetimeFigureOut">
               <a:rPr lang="en-US" smtClean="0"/>
-              <a:t>1/22/2022</a:t>
+              <a:t>1/24/2022</a:t>
             </a:fld>
             <a:endParaRPr lang="en-US"/>
           </a:p>
@@ -457,7 +457,7 @@
           <a:p>
             <a:fld id="{D665B2A5-0536-4469-8519-ACEA26E5B44D}" type="datetimeFigureOut">
               <a:rPr lang="en-US" smtClean="0"/>
-              <a:t>1/22/2022</a:t>
+              <a:t>1/24/2022</a:t>
             </a:fld>
             <a:endParaRPr lang="en-US"/>
           </a:p>
@@ -665,7 +665,7 @@
           <a:p>
             <a:fld id="{D665B2A5-0536-4469-8519-ACEA26E5B44D}" type="datetimeFigureOut">
               <a:rPr lang="en-US" smtClean="0"/>
-              <a:t>1/22/2022</a:t>
+              <a:t>1/24/2022</a:t>
             </a:fld>
             <a:endParaRPr lang="en-US"/>
           </a:p>
@@ -863,7 +863,7 @@
           <a:p>
             <a:fld id="{D665B2A5-0536-4469-8519-ACEA26E5B44D}" type="datetimeFigureOut">
               <a:rPr lang="en-US" smtClean="0"/>
-              <a:t>1/22/2022</a:t>
+              <a:t>1/24/2022</a:t>
             </a:fld>
             <a:endParaRPr lang="en-US"/>
           </a:p>
@@ -1138,7 +1138,7 @@
           <a:p>
             <a:fld id="{D665B2A5-0536-4469-8519-ACEA26E5B44D}" type="datetimeFigureOut">
               <a:rPr lang="en-US" smtClean="0"/>
-              <a:t>1/22/2022</a:t>
+              <a:t>1/24/2022</a:t>
             </a:fld>
             <a:endParaRPr lang="en-US"/>
           </a:p>
@@ -1403,7 +1403,7 @@
           <a:p>
             <a:fld id="{D665B2A5-0536-4469-8519-ACEA26E5B44D}" type="datetimeFigureOut">
               <a:rPr lang="en-US" smtClean="0"/>
-              <a:t>1/22/2022</a:t>
+              <a:t>1/24/2022</a:t>
             </a:fld>
             <a:endParaRPr lang="en-US"/>
           </a:p>
@@ -1815,7 +1815,7 @@
           <a:p>
             <a:fld id="{D665B2A5-0536-4469-8519-ACEA26E5B44D}" type="datetimeFigureOut">
               <a:rPr lang="en-US" smtClean="0"/>
-              <a:t>1/22/2022</a:t>
+              <a:t>1/24/2022</a:t>
             </a:fld>
             <a:endParaRPr lang="en-US"/>
           </a:p>
@@ -1956,7 +1956,7 @@
           <a:p>
             <a:fld id="{D665B2A5-0536-4469-8519-ACEA26E5B44D}" type="datetimeFigureOut">
               <a:rPr lang="en-US" smtClean="0"/>
-              <a:t>1/22/2022</a:t>
+              <a:t>1/24/2022</a:t>
             </a:fld>
             <a:endParaRPr lang="en-US"/>
           </a:p>
@@ -2069,7 +2069,7 @@
           <a:p>
             <a:fld id="{D665B2A5-0536-4469-8519-ACEA26E5B44D}" type="datetimeFigureOut">
               <a:rPr lang="en-US" smtClean="0"/>
-              <a:t>1/22/2022</a:t>
+              <a:t>1/24/2022</a:t>
             </a:fld>
             <a:endParaRPr lang="en-US"/>
           </a:p>
@@ -2380,7 +2380,7 @@
           <a:p>
             <a:fld id="{D665B2A5-0536-4469-8519-ACEA26E5B44D}" type="datetimeFigureOut">
               <a:rPr lang="en-US" smtClean="0"/>
-              <a:t>1/22/2022</a:t>
+              <a:t>1/24/2022</a:t>
             </a:fld>
             <a:endParaRPr lang="en-US"/>
           </a:p>
@@ -2668,7 +2668,7 @@
           <a:p>
             <a:fld id="{D665B2A5-0536-4469-8519-ACEA26E5B44D}" type="datetimeFigureOut">
               <a:rPr lang="en-US" smtClean="0"/>
-              <a:t>1/22/2022</a:t>
+              <a:t>1/24/2022</a:t>
             </a:fld>
             <a:endParaRPr lang="en-US"/>
           </a:p>
@@ -2909,7 +2909,7 @@
           <a:p>
             <a:fld id="{D665B2A5-0536-4469-8519-ACEA26E5B44D}" type="datetimeFigureOut">
               <a:rPr lang="en-US" smtClean="0"/>
-              <a:t>1/22/2022</a:t>
+              <a:t>1/24/2022</a:t>
             </a:fld>
             <a:endParaRPr lang="en-US"/>
           </a:p>
@@ -3464,7 +3464,7 @@
                           <m:ctrlPr>
                             <a:rPr lang="en-US" b="0" i="1" smtClean="0">
                               <a:solidFill>
-                                <a:schemeClr val="accent1"/>
+                                <a:schemeClr val="tx1"/>
                               </a:solidFill>
                               <a:latin typeface="Cambria Math" panose="02040503050406030204" pitchFamily="18" charset="0"/>
                             </a:rPr>
@@ -3474,7 +3474,7 @@
                           <m:r>
                             <a:rPr lang="en-US" i="1" smtClean="0">
                               <a:solidFill>
-                                <a:schemeClr val="accent1"/>
+                                <a:schemeClr val="tx1"/>
                               </a:solidFill>
                               <a:latin typeface="Cambria Math" panose="02040503050406030204" pitchFamily="18" charset="0"/>
                             </a:rPr>
@@ -3485,7 +3485,7 @@
                           <m:r>
                             <a:rPr lang="en-US" b="0" i="1" smtClean="0">
                               <a:solidFill>
-                                <a:schemeClr val="accent1"/>
+                                <a:schemeClr val="tx1"/>
                               </a:solidFill>
                               <a:latin typeface="Cambria Math" panose="02040503050406030204" pitchFamily="18" charset="0"/>
                             </a:rPr>
@@ -5240,8 +5240,8 @@
           </p:sp>
         </mc:Fallback>
       </mc:AlternateContent>
-      <mc:AlternateContent xmlns:mc="http://schemas.openxmlformats.org/markup-compatibility/2006">
-        <mc:Choice xmlns:a14="http://schemas.microsoft.com/office/drawing/2010/main" Requires="a14">
+      <mc:AlternateContent xmlns:mc="http://schemas.openxmlformats.org/markup-compatibility/2006" xmlns:a14="http://schemas.microsoft.com/office/drawing/2010/main">
+        <mc:Choice Requires="a14">
           <p:sp>
             <p:nvSpPr>
               <p:cNvPr id="17" name="TextBox 16">
@@ -5319,7 +5319,7 @@
             </p:txBody>
           </p:sp>
         </mc:Choice>
-        <mc:Fallback>
+        <mc:Fallback xmlns="">
           <p:sp>
             <p:nvSpPr>
               <p:cNvPr id="17" name="TextBox 16">
@@ -5380,8 +5380,8 @@
             </p:nvSpPr>
             <p:spPr>
               <a:xfrm>
-                <a:off x="5610445" y="4025547"/>
-                <a:ext cx="826959" cy="362984"/>
+                <a:off x="5820342" y="4025307"/>
+                <a:ext cx="868045" cy="369332"/>
               </a:xfrm>
               <a:prstGeom prst="rect">
                 <a:avLst/>
@@ -5401,9 +5401,8 @@
                         <m:ctrlPr>
                           <a:rPr lang="en-US" b="0" i="1" smtClean="0">
                             <a:solidFill>
-                              <a:schemeClr val="accent1"/>
+                              <a:schemeClr val="tx1"/>
                             </a:solidFill>
-                            <a:latin typeface="Cambria Math" panose="02040503050406030204" pitchFamily="18" charset="0"/>
                           </a:rPr>
                         </m:ctrlPr>
                       </m:sSubPr>
@@ -5411,9 +5410,8 @@
                         <m:r>
                           <a:rPr lang="en-US" i="1" smtClean="0">
                             <a:solidFill>
-                              <a:schemeClr val="accent1"/>
+                              <a:schemeClr val="tx1"/>
                             </a:solidFill>
-                            <a:latin typeface="Cambria Math" panose="02040503050406030204" pitchFamily="18" charset="0"/>
                           </a:rPr>
                           <m:t>𝑝</m:t>
                         </m:r>
@@ -5422,9 +5420,8 @@
                         <m:r>
                           <a:rPr lang="en-US" b="0" i="1" smtClean="0">
                             <a:solidFill>
-                              <a:schemeClr val="accent1"/>
+                              <a:schemeClr val="tx1"/>
                             </a:solidFill>
-                            <a:latin typeface="Cambria Math" panose="02040503050406030204" pitchFamily="18" charset="0"/>
                           </a:rPr>
                           <m:t>𝑐</m:t>
                         </m:r>
@@ -5433,30 +5430,30 @@
                   </m:oMath>
                 </a14:m>
                 <a:r>
-                  <a:rPr lang="en-US" sz="1600" dirty="0">
+                  <a:rPr lang="en-US" dirty="0">
                     <a:solidFill>
-                      <a:schemeClr val="accent1"/>
+                      <a:schemeClr val="tx1"/>
                     </a:solidFill>
                   </a:rPr>
                   <a:t>-</a:t>
                 </a:r>
                 <a:r>
-                  <a:rPr lang="en-US" sz="1600" i="1" dirty="0">
+                  <a:rPr lang="en-US" i="1" dirty="0">
                     <a:solidFill>
-                      <a:schemeClr val="accent1"/>
+                      <a:schemeClr val="tx1"/>
                     </a:solidFill>
                   </a:rPr>
                   <a:t>N</a:t>
                 </a:r>
                 <a:r>
-                  <a:rPr lang="en-US" sz="1600" dirty="0">
+                  <a:rPr lang="en-US" dirty="0">
                     <a:solidFill>
-                      <a:schemeClr val="accent1"/>
+                      <a:schemeClr val="tx1"/>
                     </a:solidFill>
                   </a:rPr>
                   <a:t>+1</a:t>
                 </a:r>
-                <a:endParaRPr lang="en-US" sz="1600" dirty="0">
+                <a:endParaRPr lang="en-US" dirty="0">
                   <a:solidFill>
                     <a:srgbClr val="FF0000"/>
                   </a:solidFill>
@@ -5482,8 +5479,8 @@
             </p:nvSpPr>
             <p:spPr>
               <a:xfrm>
-                <a:off x="5610445" y="4025547"/>
-                <a:ext cx="826959" cy="362984"/>
+                <a:off x="5820342" y="4025307"/>
+                <a:ext cx="868045" cy="369332"/>
               </a:xfrm>
               <a:prstGeom prst="rect">
                 <a:avLst/>
@@ -5491,7 +5488,7 @@
               <a:blipFill>
                 <a:blip r:embed="rId6"/>
                 <a:stretch>
-                  <a:fillRect b="-20000"/>
+                  <a:fillRect t="-8197" r="-3521" b="-24590"/>
                 </a:stretch>
               </a:blipFill>
             </p:spPr>
@@ -5510,8 +5507,8 @@
           </p:sp>
         </mc:Fallback>
       </mc:AlternateContent>
-      <mc:AlternateContent xmlns:mc="http://schemas.openxmlformats.org/markup-compatibility/2006" xmlns:a14="http://schemas.microsoft.com/office/drawing/2010/main">
-        <mc:Choice Requires="a14">
+      <mc:AlternateContent xmlns:mc="http://schemas.openxmlformats.org/markup-compatibility/2006">
+        <mc:Choice xmlns:a14="http://schemas.microsoft.com/office/drawing/2010/main" Requires="a14">
           <p:sp>
             <p:nvSpPr>
               <p:cNvPr id="19" name="TextBox 18">
@@ -5553,7 +5550,7 @@
                           <m:ctrlPr>
                             <a:rPr lang="en-US" i="1" smtClean="0">
                               <a:solidFill>
-                                <a:schemeClr val="accent1"/>
+                                <a:schemeClr val="tx1"/>
                               </a:solidFill>
                               <a:latin typeface="Cambria Math" panose="02040503050406030204" pitchFamily="18" charset="0"/>
                             </a:rPr>
@@ -5563,7 +5560,7 @@
                           <m:r>
                             <a:rPr lang="en-US" b="0" i="1" smtClean="0">
                               <a:solidFill>
-                                <a:schemeClr val="accent1"/>
+                                <a:schemeClr val="tx1"/>
                               </a:solidFill>
                               <a:latin typeface="Cambria Math" panose="02040503050406030204" pitchFamily="18" charset="0"/>
                             </a:rPr>
@@ -5583,7 +5580,7 @@
             </p:txBody>
           </p:sp>
         </mc:Choice>
-        <mc:Fallback xmlns="">
+        <mc:Fallback>
           <p:sp>
             <p:nvSpPr>
               <p:cNvPr id="19" name="TextBox 18">
@@ -5651,6 +5648,9 @@
             <a:avLst/>
           </a:prstGeom>
           <a:ln w="19050">
+            <a:solidFill>
+              <a:schemeClr val="tx1"/>
+            </a:solidFill>
             <a:tailEnd type="triangle"/>
           </a:ln>
         </p:spPr>
@@ -5692,6 +5692,9 @@
             <a:avLst/>
           </a:prstGeom>
           <a:ln w="19050">
+            <a:solidFill>
+              <a:schemeClr val="tx1"/>
+            </a:solidFill>
             <a:tailEnd type="triangle"/>
           </a:ln>
         </p:spPr>
@@ -5710,8 +5713,8 @@
           </a:fontRef>
         </p:style>
       </p:cxnSp>
-      <mc:AlternateContent xmlns:mc="http://schemas.openxmlformats.org/markup-compatibility/2006" xmlns:a14="http://schemas.microsoft.com/office/drawing/2010/main">
-        <mc:Choice Requires="a14">
+      <mc:AlternateContent xmlns:mc="http://schemas.openxmlformats.org/markup-compatibility/2006">
+        <mc:Choice xmlns:a14="http://schemas.microsoft.com/office/drawing/2010/main" Requires="a14">
           <p:sp>
             <p:nvSpPr>
               <p:cNvPr id="22" name="TextBox 21">
@@ -5750,7 +5753,7 @@
                       <m:r>
                         <a:rPr lang="en-US" sz="1600" i="1" smtClean="0">
                           <a:solidFill>
-                            <a:schemeClr val="accent1"/>
+                            <a:schemeClr val="tx1"/>
                           </a:solidFill>
                           <a:latin typeface="Cambria Math" panose="02040503050406030204" pitchFamily="18" charset="0"/>
                           <a:ea typeface="Cambria Math" panose="02040503050406030204" pitchFamily="18" charset="0"/>
@@ -5762,14 +5765,14 @@
                 </a14:m>
                 <a:endParaRPr lang="en-US" sz="1600" dirty="0">
                   <a:solidFill>
-                    <a:schemeClr val="accent1"/>
+                    <a:schemeClr val="tx1"/>
                   </a:solidFill>
                 </a:endParaRPr>
               </a:p>
             </p:txBody>
           </p:sp>
         </mc:Choice>
-        <mc:Fallback xmlns="">
+        <mc:Fallback>
           <p:sp>
             <p:nvSpPr>
               <p:cNvPr id="22" name="TextBox 21">
@@ -5841,6 +5844,474 @@
               <a:schemeClr val="accent1"/>
             </a:solidFill>
           </a:ln>
+        </p:spPr>
+        <p:style>
+          <a:lnRef idx="1">
+            <a:schemeClr val="accent1"/>
+          </a:lnRef>
+          <a:fillRef idx="0">
+            <a:schemeClr val="accent1"/>
+          </a:fillRef>
+          <a:effectRef idx="0">
+            <a:schemeClr val="accent1"/>
+          </a:effectRef>
+          <a:fontRef idx="minor">
+            <a:schemeClr val="tx1"/>
+          </a:fontRef>
+        </p:style>
+      </p:cxnSp>
+      <p:cxnSp>
+        <p:nvCxnSpPr>
+          <p:cNvPr id="3" name="Straight Connector 2">
+            <a:extLst>
+              <a:ext uri="{FF2B5EF4-FFF2-40B4-BE49-F238E27FC236}">
+                <a16:creationId xmlns:a16="http://schemas.microsoft.com/office/drawing/2014/main" id="{37485A5C-DCF3-43B2-8B8F-17FE98BF7FC6}"/>
+              </a:ext>
+            </a:extLst>
+          </p:cNvPr>
+          <p:cNvCxnSpPr/>
+          <p:nvPr/>
+        </p:nvCxnSpPr>
+        <p:spPr>
+          <a:xfrm flipH="1">
+            <a:off x="5261242" y="3053076"/>
+            <a:ext cx="310922" cy="286149"/>
+          </a:xfrm>
+          <a:prstGeom prst="line">
+            <a:avLst/>
+          </a:prstGeom>
+          <a:ln w="31750"/>
+        </p:spPr>
+        <p:style>
+          <a:lnRef idx="1">
+            <a:schemeClr val="accent1"/>
+          </a:lnRef>
+          <a:fillRef idx="0">
+            <a:schemeClr val="accent1"/>
+          </a:fillRef>
+          <a:effectRef idx="0">
+            <a:schemeClr val="accent1"/>
+          </a:effectRef>
+          <a:fontRef idx="minor">
+            <a:schemeClr val="tx1"/>
+          </a:fontRef>
+        </p:style>
+      </p:cxnSp>
+      <p:cxnSp>
+        <p:nvCxnSpPr>
+          <p:cNvPr id="24" name="Straight Connector 23">
+            <a:extLst>
+              <a:ext uri="{FF2B5EF4-FFF2-40B4-BE49-F238E27FC236}">
+                <a16:creationId xmlns:a16="http://schemas.microsoft.com/office/drawing/2014/main" id="{4B1E6223-69FF-485A-8F58-64971BFCF8D0}"/>
+              </a:ext>
+            </a:extLst>
+          </p:cNvPr>
+          <p:cNvCxnSpPr>
+            <a:cxnSpLocks/>
+            <a:endCxn id="16" idx="1"/>
+          </p:cNvCxnSpPr>
+          <p:nvPr/>
+        </p:nvCxnSpPr>
+        <p:spPr>
+          <a:xfrm flipH="1">
+            <a:off x="5261242" y="3057596"/>
+            <a:ext cx="482274" cy="450906"/>
+          </a:xfrm>
+          <a:prstGeom prst="line">
+            <a:avLst/>
+          </a:prstGeom>
+          <a:ln w="31750"/>
+        </p:spPr>
+        <p:style>
+          <a:lnRef idx="1">
+            <a:schemeClr val="accent1"/>
+          </a:lnRef>
+          <a:fillRef idx="0">
+            <a:schemeClr val="accent1"/>
+          </a:fillRef>
+          <a:effectRef idx="0">
+            <a:schemeClr val="accent1"/>
+          </a:effectRef>
+          <a:fontRef idx="minor">
+            <a:schemeClr val="tx1"/>
+          </a:fontRef>
+        </p:style>
+      </p:cxnSp>
+      <p:cxnSp>
+        <p:nvCxnSpPr>
+          <p:cNvPr id="25" name="Straight Connector 24">
+            <a:extLst>
+              <a:ext uri="{FF2B5EF4-FFF2-40B4-BE49-F238E27FC236}">
+                <a16:creationId xmlns:a16="http://schemas.microsoft.com/office/drawing/2014/main" id="{84557213-50E3-4B36-AE52-9D49387CF2AB}"/>
+              </a:ext>
+            </a:extLst>
+          </p:cNvPr>
+          <p:cNvCxnSpPr>
+            <a:cxnSpLocks/>
+          </p:cNvCxnSpPr>
+          <p:nvPr/>
+        </p:nvCxnSpPr>
+        <p:spPr>
+          <a:xfrm flipH="1">
+            <a:off x="5438979" y="3518595"/>
+            <a:ext cx="464136" cy="450734"/>
+          </a:xfrm>
+          <a:prstGeom prst="line">
+            <a:avLst/>
+          </a:prstGeom>
+          <a:ln w="31750"/>
+        </p:spPr>
+        <p:style>
+          <a:lnRef idx="1">
+            <a:schemeClr val="accent1"/>
+          </a:lnRef>
+          <a:fillRef idx="0">
+            <a:schemeClr val="accent1"/>
+          </a:fillRef>
+          <a:effectRef idx="0">
+            <a:schemeClr val="accent1"/>
+          </a:effectRef>
+          <a:fontRef idx="minor">
+            <a:schemeClr val="tx1"/>
+          </a:fontRef>
+        </p:style>
+      </p:cxnSp>
+      <p:cxnSp>
+        <p:nvCxnSpPr>
+          <p:cNvPr id="26" name="Straight Connector 25">
+            <a:extLst>
+              <a:ext uri="{FF2B5EF4-FFF2-40B4-BE49-F238E27FC236}">
+                <a16:creationId xmlns:a16="http://schemas.microsoft.com/office/drawing/2014/main" id="{C01CBE17-919C-44AE-9281-D9BE0FA0883C}"/>
+              </a:ext>
+            </a:extLst>
+          </p:cNvPr>
+          <p:cNvCxnSpPr>
+            <a:cxnSpLocks/>
+          </p:cNvCxnSpPr>
+          <p:nvPr/>
+        </p:nvCxnSpPr>
+        <p:spPr>
+          <a:xfrm flipH="1">
+            <a:off x="5249803" y="3647424"/>
+            <a:ext cx="205704" cy="192805"/>
+          </a:xfrm>
+          <a:prstGeom prst="line">
+            <a:avLst/>
+          </a:prstGeom>
+          <a:ln w="31750"/>
+        </p:spPr>
+        <p:style>
+          <a:lnRef idx="1">
+            <a:schemeClr val="accent1"/>
+          </a:lnRef>
+          <a:fillRef idx="0">
+            <a:schemeClr val="accent1"/>
+          </a:fillRef>
+          <a:effectRef idx="0">
+            <a:schemeClr val="accent1"/>
+          </a:effectRef>
+          <a:fontRef idx="minor">
+            <a:schemeClr val="tx1"/>
+          </a:fontRef>
+        </p:style>
+      </p:cxnSp>
+      <p:cxnSp>
+        <p:nvCxnSpPr>
+          <p:cNvPr id="27" name="Straight Connector 26">
+            <a:extLst>
+              <a:ext uri="{FF2B5EF4-FFF2-40B4-BE49-F238E27FC236}">
+                <a16:creationId xmlns:a16="http://schemas.microsoft.com/office/drawing/2014/main" id="{E11983F0-4E0E-4EF7-B7E9-21D5333C2623}"/>
+              </a:ext>
+            </a:extLst>
+          </p:cNvPr>
+          <p:cNvCxnSpPr>
+            <a:cxnSpLocks/>
+            <a:stCxn id="16" idx="2"/>
+          </p:cNvCxnSpPr>
+          <p:nvPr/>
+        </p:nvCxnSpPr>
+        <p:spPr>
+          <a:xfrm flipH="1">
+            <a:off x="5280076" y="3677779"/>
+            <a:ext cx="290830" cy="290391"/>
+          </a:xfrm>
+          <a:prstGeom prst="line">
+            <a:avLst/>
+          </a:prstGeom>
+          <a:ln w="31750"/>
+        </p:spPr>
+        <p:style>
+          <a:lnRef idx="1">
+            <a:schemeClr val="accent1"/>
+          </a:lnRef>
+          <a:fillRef idx="0">
+            <a:schemeClr val="accent1"/>
+          </a:fillRef>
+          <a:effectRef idx="0">
+            <a:schemeClr val="accent1"/>
+          </a:effectRef>
+          <a:fontRef idx="minor">
+            <a:schemeClr val="tx1"/>
+          </a:fontRef>
+        </p:style>
+      </p:cxnSp>
+      <p:cxnSp>
+        <p:nvCxnSpPr>
+          <p:cNvPr id="35" name="Straight Connector 34">
+            <a:extLst>
+              <a:ext uri="{FF2B5EF4-FFF2-40B4-BE49-F238E27FC236}">
+                <a16:creationId xmlns:a16="http://schemas.microsoft.com/office/drawing/2014/main" id="{FB6852C7-E1E9-4E2D-89F9-FD2A259C068F}"/>
+              </a:ext>
+            </a:extLst>
+          </p:cNvPr>
+          <p:cNvCxnSpPr>
+            <a:cxnSpLocks/>
+          </p:cNvCxnSpPr>
+          <p:nvPr/>
+        </p:nvCxnSpPr>
+        <p:spPr>
+          <a:xfrm flipH="1">
+            <a:off x="5589741" y="3683630"/>
+            <a:ext cx="290830" cy="290391"/>
+          </a:xfrm>
+          <a:prstGeom prst="line">
+            <a:avLst/>
+          </a:prstGeom>
+          <a:ln w="31750"/>
+        </p:spPr>
+        <p:style>
+          <a:lnRef idx="1">
+            <a:schemeClr val="accent1"/>
+          </a:lnRef>
+          <a:fillRef idx="0">
+            <a:schemeClr val="accent1"/>
+          </a:fillRef>
+          <a:effectRef idx="0">
+            <a:schemeClr val="accent1"/>
+          </a:effectRef>
+          <a:fontRef idx="minor">
+            <a:schemeClr val="tx1"/>
+          </a:fontRef>
+        </p:style>
+      </p:cxnSp>
+      <p:cxnSp>
+        <p:nvCxnSpPr>
+          <p:cNvPr id="36" name="Straight Connector 35">
+            <a:extLst>
+              <a:ext uri="{FF2B5EF4-FFF2-40B4-BE49-F238E27FC236}">
+                <a16:creationId xmlns:a16="http://schemas.microsoft.com/office/drawing/2014/main" id="{C36B0F41-1D75-4C0F-9FD0-663B7F902010}"/>
+              </a:ext>
+            </a:extLst>
+          </p:cNvPr>
+          <p:cNvCxnSpPr>
+            <a:cxnSpLocks/>
+          </p:cNvCxnSpPr>
+          <p:nvPr/>
+        </p:nvCxnSpPr>
+        <p:spPr>
+          <a:xfrm flipH="1">
+            <a:off x="5721825" y="3804925"/>
+            <a:ext cx="185673" cy="176358"/>
+          </a:xfrm>
+          <a:prstGeom prst="line">
+            <a:avLst/>
+          </a:prstGeom>
+          <a:ln w="31750"/>
+        </p:spPr>
+        <p:style>
+          <a:lnRef idx="1">
+            <a:schemeClr val="accent1"/>
+          </a:lnRef>
+          <a:fillRef idx="0">
+            <a:schemeClr val="accent1"/>
+          </a:fillRef>
+          <a:effectRef idx="0">
+            <a:schemeClr val="accent1"/>
+          </a:effectRef>
+          <a:fontRef idx="minor">
+            <a:schemeClr val="tx1"/>
+          </a:fontRef>
+        </p:style>
+      </p:cxnSp>
+      <p:cxnSp>
+        <p:nvCxnSpPr>
+          <p:cNvPr id="37" name="Straight Connector 36">
+            <a:extLst>
+              <a:ext uri="{FF2B5EF4-FFF2-40B4-BE49-F238E27FC236}">
+                <a16:creationId xmlns:a16="http://schemas.microsoft.com/office/drawing/2014/main" id="{70FC5091-59CA-4BC6-910F-82A24F5B7E83}"/>
+              </a:ext>
+            </a:extLst>
+          </p:cNvPr>
+          <p:cNvCxnSpPr>
+            <a:cxnSpLocks/>
+          </p:cNvCxnSpPr>
+          <p:nvPr/>
+        </p:nvCxnSpPr>
+        <p:spPr>
+          <a:xfrm flipH="1">
+            <a:off x="5599089" y="3104602"/>
+            <a:ext cx="250761" cy="248958"/>
+          </a:xfrm>
+          <a:prstGeom prst="line">
+            <a:avLst/>
+          </a:prstGeom>
+          <a:ln w="31750"/>
+        </p:spPr>
+        <p:style>
+          <a:lnRef idx="1">
+            <a:schemeClr val="accent1"/>
+          </a:lnRef>
+          <a:fillRef idx="0">
+            <a:schemeClr val="accent1"/>
+          </a:fillRef>
+          <a:effectRef idx="0">
+            <a:schemeClr val="accent1"/>
+          </a:effectRef>
+          <a:fontRef idx="minor">
+            <a:schemeClr val="tx1"/>
+          </a:fontRef>
+        </p:style>
+      </p:cxnSp>
+      <p:cxnSp>
+        <p:nvCxnSpPr>
+          <p:cNvPr id="42" name="Straight Connector 41">
+            <a:extLst>
+              <a:ext uri="{FF2B5EF4-FFF2-40B4-BE49-F238E27FC236}">
+                <a16:creationId xmlns:a16="http://schemas.microsoft.com/office/drawing/2014/main" id="{0555897B-E1DA-4AA1-9094-5B502E7F99D8}"/>
+              </a:ext>
+            </a:extLst>
+          </p:cNvPr>
+          <p:cNvCxnSpPr>
+            <a:cxnSpLocks/>
+          </p:cNvCxnSpPr>
+          <p:nvPr/>
+        </p:nvCxnSpPr>
+        <p:spPr>
+          <a:xfrm flipH="1">
+            <a:off x="5692673" y="3187120"/>
+            <a:ext cx="250761" cy="248958"/>
+          </a:xfrm>
+          <a:prstGeom prst="line">
+            <a:avLst/>
+          </a:prstGeom>
+          <a:ln w="31750"/>
+        </p:spPr>
+        <p:style>
+          <a:lnRef idx="1">
+            <a:schemeClr val="accent1"/>
+          </a:lnRef>
+          <a:fillRef idx="0">
+            <a:schemeClr val="accent1"/>
+          </a:fillRef>
+          <a:effectRef idx="0">
+            <a:schemeClr val="accent1"/>
+          </a:effectRef>
+          <a:fontRef idx="minor">
+            <a:schemeClr val="tx1"/>
+          </a:fontRef>
+        </p:style>
+      </p:cxnSp>
+      <p:cxnSp>
+        <p:nvCxnSpPr>
+          <p:cNvPr id="43" name="Straight Connector 42">
+            <a:extLst>
+              <a:ext uri="{FF2B5EF4-FFF2-40B4-BE49-F238E27FC236}">
+                <a16:creationId xmlns:a16="http://schemas.microsoft.com/office/drawing/2014/main" id="{0047D76E-B40D-456C-8CA7-C460D851FB5A}"/>
+              </a:ext>
+            </a:extLst>
+          </p:cNvPr>
+          <p:cNvCxnSpPr>
+            <a:cxnSpLocks/>
+          </p:cNvCxnSpPr>
+          <p:nvPr/>
+        </p:nvCxnSpPr>
+        <p:spPr>
+          <a:xfrm flipH="1">
+            <a:off x="5721825" y="3287699"/>
+            <a:ext cx="250761" cy="248958"/>
+          </a:xfrm>
+          <a:prstGeom prst="line">
+            <a:avLst/>
+          </a:prstGeom>
+          <a:ln w="31750"/>
+        </p:spPr>
+        <p:style>
+          <a:lnRef idx="1">
+            <a:schemeClr val="accent1"/>
+          </a:lnRef>
+          <a:fillRef idx="0">
+            <a:schemeClr val="accent1"/>
+          </a:fillRef>
+          <a:effectRef idx="0">
+            <a:schemeClr val="accent1"/>
+          </a:effectRef>
+          <a:fontRef idx="minor">
+            <a:schemeClr val="tx1"/>
+          </a:fontRef>
+        </p:style>
+      </p:cxnSp>
+      <p:cxnSp>
+        <p:nvCxnSpPr>
+          <p:cNvPr id="44" name="Straight Connector 43">
+            <a:extLst>
+              <a:ext uri="{FF2B5EF4-FFF2-40B4-BE49-F238E27FC236}">
+                <a16:creationId xmlns:a16="http://schemas.microsoft.com/office/drawing/2014/main" id="{73CB17C2-7B6B-4594-8BA3-B9D7528A1D57}"/>
+              </a:ext>
+            </a:extLst>
+          </p:cNvPr>
+          <p:cNvCxnSpPr>
+            <a:cxnSpLocks/>
+          </p:cNvCxnSpPr>
+          <p:nvPr/>
+        </p:nvCxnSpPr>
+        <p:spPr>
+          <a:xfrm flipH="1">
+            <a:off x="5230785" y="3573848"/>
+            <a:ext cx="154124" cy="139228"/>
+          </a:xfrm>
+          <a:prstGeom prst="line">
+            <a:avLst/>
+          </a:prstGeom>
+          <a:ln w="31750"/>
+        </p:spPr>
+        <p:style>
+          <a:lnRef idx="1">
+            <a:schemeClr val="accent1"/>
+          </a:lnRef>
+          <a:fillRef idx="0">
+            <a:schemeClr val="accent1"/>
+          </a:fillRef>
+          <a:effectRef idx="0">
+            <a:schemeClr val="accent1"/>
+          </a:effectRef>
+          <a:fontRef idx="minor">
+            <a:schemeClr val="tx1"/>
+          </a:fontRef>
+        </p:style>
+      </p:cxnSp>
+      <p:cxnSp>
+        <p:nvCxnSpPr>
+          <p:cNvPr id="46" name="Straight Connector 45">
+            <a:extLst>
+              <a:ext uri="{FF2B5EF4-FFF2-40B4-BE49-F238E27FC236}">
+                <a16:creationId xmlns:a16="http://schemas.microsoft.com/office/drawing/2014/main" id="{4A5F8E76-76FC-43AC-8770-2F74ABC7E03C}"/>
+              </a:ext>
+            </a:extLst>
+          </p:cNvPr>
+          <p:cNvCxnSpPr>
+            <a:cxnSpLocks/>
+          </p:cNvCxnSpPr>
+          <p:nvPr/>
+        </p:nvCxnSpPr>
+        <p:spPr>
+          <a:xfrm flipH="1">
+            <a:off x="5211274" y="2980618"/>
+            <a:ext cx="250761" cy="248958"/>
+          </a:xfrm>
+          <a:prstGeom prst="line">
+            <a:avLst/>
+          </a:prstGeom>
+          <a:ln w="31750"/>
         </p:spPr>
         <p:style>
           <a:lnRef idx="1">

</xml_diff>